<commit_message>
Add pm, and ppm
</commit_message>
<xml_diff>
--- a/ppts/photonmapping/Primary Sample Space Path Guiding.pptx
+++ b/ppts/photonmapping/Primary Sample Space Path Guiding.pptx
@@ -7606,7 +7606,7 @@
               <a:t>PSS</a:t>
             </a:r>
             <a:r>
-              <a:rPr lang="ja-JP" altLang="en-US" sz="2000"/>
+              <a:rPr lang="ja-JP" altLang="en-US" sz="2000" dirty="0"/>
               <a:t>内で行う</a:t>
             </a:r>
             <a:endParaRPr lang="en-US" altLang="ja-JP" sz="2000" dirty="0"/>
@@ -8139,7 +8139,7 @@
         </p:blipFill>
         <p:spPr>
           <a:xfrm>
-            <a:off x="2120396" y="897626"/>
+            <a:off x="1775520" y="879130"/>
             <a:ext cx="7230484" cy="5229955"/>
           </a:xfrm>
           <a:prstGeom prst="rect">

</xml_diff>